<commit_message>
Added more info slide at end
</commit_message>
<xml_diff>
--- a/Demo/Bcology.pptx
+++ b/Demo/Bcology.pptx
@@ -18,11 +18,12 @@
     <p:sldId id="268" r:id="rId12"/>
     <p:sldId id="269" r:id="rId13"/>
     <p:sldId id="270" r:id="rId14"/>
+    <p:sldId id="271" r:id="rId15"/>
   </p:sldIdLst>
   <p:sldSz cx="9144000" cy="6858000" type="screen4x3"/>
   <p:notesSz cx="6858000" cy="9144000"/>
   <p:custDataLst>
-    <p:tags r:id="rId15"/>
+    <p:tags r:id="rId17"/>
   </p:custDataLst>
   <p:defaultTextStyle>
     <a:defPPr>
@@ -2498,6 +2499,13 @@
         </dgm:presLayoutVars>
       </dgm:prSet>
       <dgm:spPr/>
+      <dgm:t>
+        <a:bodyPr/>
+        <a:lstStyle/>
+        <a:p>
+          <a:endParaRPr lang="en-US"/>
+        </a:p>
+      </dgm:t>
     </dgm:pt>
     <dgm:pt modelId="{B3B9738F-9BC9-4DF8-8512-99863A7648EB}" type="pres">
       <dgm:prSet presAssocID="{D81FC87D-97A6-47B5-9BA1-B725071357A4}" presName="Accent1" presStyleCnt="0"/>
@@ -2658,6 +2666,13 @@
         </dgm:presLayoutVars>
       </dgm:prSet>
       <dgm:spPr/>
+      <dgm:t>
+        <a:bodyPr/>
+        <a:lstStyle/>
+        <a:p>
+          <a:endParaRPr lang="en-US"/>
+        </a:p>
+      </dgm:t>
     </dgm:pt>
     <dgm:pt modelId="{CF868587-C968-4EF8-9433-03DAD4C3BBCA}" type="pres">
       <dgm:prSet presAssocID="{6481218C-1B37-40BD-9DE1-82DDBEB5CC78}" presName="arrowNode" presStyleLbl="node1" presStyleIdx="0" presStyleCnt="1" custAng="13525007" custScaleX="64296" custScaleY="63606" custLinFactNeighborX="-44622" custLinFactNeighborY="-10869"/>
@@ -2680,8 +2695,8 @@
     </dgm:pt>
   </dgm:ptLst>
   <dgm:cxnLst>
+    <dgm:cxn modelId="{3E5B500C-C5A0-46D5-8183-72A5AF32FE39}" srcId="{6481218C-1B37-40BD-9DE1-82DDBEB5CC78}" destId="{B610A947-D042-4484-815B-ABE4F4C46F80}" srcOrd="0" destOrd="0" parTransId="{B8856389-969B-4556-B947-87A9E9C74CAE}" sibTransId="{F5317D76-5C34-4DE2-A595-F67BB0B5AFE9}"/>
     <dgm:cxn modelId="{0C6D853D-899B-4BC7-A1FE-1D27CB05B367}" type="presOf" srcId="{B610A947-D042-4484-815B-ABE4F4C46F80}" destId="{A820F54B-5B11-4F17-A226-990E3E48FFB9}" srcOrd="0" destOrd="0" presId="urn:microsoft.com/office/officeart/2009/3/layout/DescendingProcess"/>
-    <dgm:cxn modelId="{3E5B500C-C5A0-46D5-8183-72A5AF32FE39}" srcId="{6481218C-1B37-40BD-9DE1-82DDBEB5CC78}" destId="{B610A947-D042-4484-815B-ABE4F4C46F80}" srcOrd="0" destOrd="0" parTransId="{B8856389-969B-4556-B947-87A9E9C74CAE}" sibTransId="{F5317D76-5C34-4DE2-A595-F67BB0B5AFE9}"/>
     <dgm:cxn modelId="{65369116-2BB4-4A8F-A9BB-429D06974017}" type="presOf" srcId="{6481218C-1B37-40BD-9DE1-82DDBEB5CC78}" destId="{DE126BA7-4B27-48C5-BFD9-3B21229BA32B}" srcOrd="0" destOrd="0" presId="urn:microsoft.com/office/officeart/2009/3/layout/DescendingProcess"/>
     <dgm:cxn modelId="{89E1967C-92E9-4E31-B6E5-2BDE10BDDF7A}" type="presParOf" srcId="{DE126BA7-4B27-48C5-BFD9-3B21229BA32B}" destId="{CF868587-C968-4EF8-9433-03DAD4C3BBCA}" srcOrd="0" destOrd="0" presId="urn:microsoft.com/office/officeart/2009/3/layout/DescendingProcess"/>
     <dgm:cxn modelId="{70CC4F9E-5E51-4F63-98E8-896B2D1B82E6}" type="presParOf" srcId="{DE126BA7-4B27-48C5-BFD9-3B21229BA32B}" destId="{A820F54B-5B11-4F17-A226-990E3E48FFB9}" srcOrd="1" destOrd="0" presId="urn:microsoft.com/office/officeart/2009/3/layout/DescendingProcess"/>
@@ -2991,15 +3006,15 @@
     </dgm:pt>
   </dgm:ptLst>
   <dgm:cxnLst>
+    <dgm:cxn modelId="{EA6E5FF9-2201-4EE8-8ACE-925F46DF6B9E}" type="presOf" srcId="{2DADC933-1635-4EB1-B5E8-1C9C38359F92}" destId="{02BA6D95-2417-4BD1-82EB-D4DE4EF002F5}" srcOrd="0" destOrd="0" presId="urn:microsoft.com/office/officeart/2005/8/layout/arrow2"/>
+    <dgm:cxn modelId="{B44CBEE5-43A6-4EA8-9536-FCD3D0118FD3}" srcId="{20F268FF-9DE8-4DFB-B8C1-D11F4B35A8FD}" destId="{2DADC933-1635-4EB1-B5E8-1C9C38359F92}" srcOrd="3" destOrd="0" parTransId="{A47DC5C2-58E8-4511-AEB9-71EB0118BF31}" sibTransId="{5CAF8028-F69F-42E3-A649-C1A750DFEE50}"/>
+    <dgm:cxn modelId="{8731C24E-40ED-4077-A295-D619E66C6AAA}" srcId="{20F268FF-9DE8-4DFB-B8C1-D11F4B35A8FD}" destId="{BDF0DAB4-D6E9-49CE-9270-DAC07B2C3053}" srcOrd="0" destOrd="0" parTransId="{FA2C0875-BB20-4CC5-A3C1-630CA1B4702A}" sibTransId="{2F4FD47D-2819-4E9A-93EC-28CB4E89DDAE}"/>
+    <dgm:cxn modelId="{60C2E299-9F62-4A2C-84AD-55D021272BD7}" type="presOf" srcId="{C63B603F-C568-4AB7-B96B-DA8CF29E59A2}" destId="{7A149A7E-BD17-4A34-ACD3-8BFBAB114421}" srcOrd="0" destOrd="0" presId="urn:microsoft.com/office/officeart/2005/8/layout/arrow2"/>
+    <dgm:cxn modelId="{6006B7DB-C934-4D22-87F9-3FD2F39E7237}" type="presOf" srcId="{20F268FF-9DE8-4DFB-B8C1-D11F4B35A8FD}" destId="{FDB2D600-B9DB-48B6-B5A8-1D3823858C49}" srcOrd="0" destOrd="0" presId="urn:microsoft.com/office/officeart/2005/8/layout/arrow2"/>
+    <dgm:cxn modelId="{8B48668C-2F19-4206-8BB2-8363CFBBC4A7}" srcId="{20F268FF-9DE8-4DFB-B8C1-D11F4B35A8FD}" destId="{68020141-CDAA-4744-BB1A-37643043C260}" srcOrd="1" destOrd="0" parTransId="{78F58555-E357-4C71-996F-CF1F7C6C575D}" sibTransId="{77B766F9-610A-4012-8B08-9ACE364F0DFA}"/>
+    <dgm:cxn modelId="{3D041CCF-26D6-429E-8F42-B3E5E379C021}" type="presOf" srcId="{BDF0DAB4-D6E9-49CE-9270-DAC07B2C3053}" destId="{DEA76F9B-946E-4CD5-ADAE-75B410B00CCC}" srcOrd="0" destOrd="0" presId="urn:microsoft.com/office/officeart/2005/8/layout/arrow2"/>
     <dgm:cxn modelId="{1DBB946B-61A9-48E7-9E8C-9C72BDFED9B6}" srcId="{20F268FF-9DE8-4DFB-B8C1-D11F4B35A8FD}" destId="{C63B603F-C568-4AB7-B96B-DA8CF29E59A2}" srcOrd="2" destOrd="0" parTransId="{78A66D43-3D57-4CC9-B48C-BE4BA2967E25}" sibTransId="{04A833E8-D924-413D-9CE9-5ADE2DF40654}"/>
-    <dgm:cxn modelId="{8731C24E-40ED-4077-A295-D619E66C6AAA}" srcId="{20F268FF-9DE8-4DFB-B8C1-D11F4B35A8FD}" destId="{BDF0DAB4-D6E9-49CE-9270-DAC07B2C3053}" srcOrd="0" destOrd="0" parTransId="{FA2C0875-BB20-4CC5-A3C1-630CA1B4702A}" sibTransId="{2F4FD47D-2819-4E9A-93EC-28CB4E89DDAE}"/>
-    <dgm:cxn modelId="{6006B7DB-C934-4D22-87F9-3FD2F39E7237}" type="presOf" srcId="{20F268FF-9DE8-4DFB-B8C1-D11F4B35A8FD}" destId="{FDB2D600-B9DB-48B6-B5A8-1D3823858C49}" srcOrd="0" destOrd="0" presId="urn:microsoft.com/office/officeart/2005/8/layout/arrow2"/>
     <dgm:cxn modelId="{FC7AA173-C1BC-4B1A-B23B-A5A78822B51A}" type="presOf" srcId="{68020141-CDAA-4744-BB1A-37643043C260}" destId="{A7090C8F-67F2-40FD-B525-DDDD9A93658C}" srcOrd="0" destOrd="0" presId="urn:microsoft.com/office/officeart/2005/8/layout/arrow2"/>
-    <dgm:cxn modelId="{60C2E299-9F62-4A2C-84AD-55D021272BD7}" type="presOf" srcId="{C63B603F-C568-4AB7-B96B-DA8CF29E59A2}" destId="{7A149A7E-BD17-4A34-ACD3-8BFBAB114421}" srcOrd="0" destOrd="0" presId="urn:microsoft.com/office/officeart/2005/8/layout/arrow2"/>
-    <dgm:cxn modelId="{8B48668C-2F19-4206-8BB2-8363CFBBC4A7}" srcId="{20F268FF-9DE8-4DFB-B8C1-D11F4B35A8FD}" destId="{68020141-CDAA-4744-BB1A-37643043C260}" srcOrd="1" destOrd="0" parTransId="{78F58555-E357-4C71-996F-CF1F7C6C575D}" sibTransId="{77B766F9-610A-4012-8B08-9ACE364F0DFA}"/>
-    <dgm:cxn modelId="{B44CBEE5-43A6-4EA8-9536-FCD3D0118FD3}" srcId="{20F268FF-9DE8-4DFB-B8C1-D11F4B35A8FD}" destId="{2DADC933-1635-4EB1-B5E8-1C9C38359F92}" srcOrd="3" destOrd="0" parTransId="{A47DC5C2-58E8-4511-AEB9-71EB0118BF31}" sibTransId="{5CAF8028-F69F-42E3-A649-C1A750DFEE50}"/>
-    <dgm:cxn modelId="{3D041CCF-26D6-429E-8F42-B3E5E379C021}" type="presOf" srcId="{BDF0DAB4-D6E9-49CE-9270-DAC07B2C3053}" destId="{DEA76F9B-946E-4CD5-ADAE-75B410B00CCC}" srcOrd="0" destOrd="0" presId="urn:microsoft.com/office/officeart/2005/8/layout/arrow2"/>
-    <dgm:cxn modelId="{EA6E5FF9-2201-4EE8-8ACE-925F46DF6B9E}" type="presOf" srcId="{2DADC933-1635-4EB1-B5E8-1C9C38359F92}" destId="{02BA6D95-2417-4BD1-82EB-D4DE4EF002F5}" srcOrd="0" destOrd="0" presId="urn:microsoft.com/office/officeart/2005/8/layout/arrow2"/>
     <dgm:cxn modelId="{168E8133-6D37-4373-971B-F0CA57AE536B}" type="presParOf" srcId="{FDB2D600-B9DB-48B6-B5A8-1D3823858C49}" destId="{5FE476A7-3FEB-489A-88B0-999EF4E080D4}" srcOrd="0" destOrd="0" presId="urn:microsoft.com/office/officeart/2005/8/layout/arrow2"/>
     <dgm:cxn modelId="{2046B250-61A1-4376-9799-BA46DCC0F599}" type="presParOf" srcId="{FDB2D600-B9DB-48B6-B5A8-1D3823858C49}" destId="{1965C6C3-3076-48F2-B734-ACB874C8E75F}" srcOrd="1" destOrd="0" presId="urn:microsoft.com/office/officeart/2005/8/layout/arrow2"/>
     <dgm:cxn modelId="{415E8EE1-4D7B-4B64-91B2-337A9454EA1D}" type="presParOf" srcId="{1965C6C3-3076-48F2-B734-ACB874C8E75F}" destId="{289ED55D-9210-4586-ADBA-5E51955A1805}" srcOrd="0" destOrd="0" presId="urn:microsoft.com/office/officeart/2005/8/layout/arrow2"/>
@@ -3468,12 +3483,12 @@
         <a:fontRef idx="minor"/>
       </dsp:style>
       <dsp:txBody>
-        <a:bodyPr spcFirstLastPara="0" vert="horz" wrap="square" lIns="71120" tIns="71120" rIns="71120" bIns="71120" numCol="1" spcCol="1270" anchor="b" anchorCtr="0">
+        <a:bodyPr spcFirstLastPara="0" vert="horz" wrap="square" lIns="66040" tIns="66040" rIns="66040" bIns="66040" numCol="1" spcCol="1270" anchor="b" anchorCtr="0">
           <a:noAutofit/>
         </a:bodyPr>
         <a:lstStyle/>
         <a:p>
-          <a:pPr lvl="0" algn="ctr" defTabSz="2489200">
+          <a:pPr lvl="0" algn="ctr" defTabSz="2311400">
             <a:lnSpc>
               <a:spcPct val="90000"/>
             </a:lnSpc>
@@ -3484,7 +3499,7 @@
               <a:spcPct val="35000"/>
             </a:spcAft>
           </a:pPr>
-          <a:endParaRPr lang="en-US" sz="5600" kern="1200" dirty="0"/>
+          <a:endParaRPr lang="en-US" sz="5200" kern="1200" dirty="0"/>
         </a:p>
       </dsp:txBody>
       <dsp:txXfrm>
@@ -3633,7 +3648,7 @@
         </a:bodyPr>
         <a:lstStyle/>
         <a:p>
-          <a:pPr lvl="0" algn="l" defTabSz="844550">
+          <a:pPr lvl="0" algn="l" defTabSz="800100">
             <a:lnSpc>
               <a:spcPct val="90000"/>
             </a:lnSpc>
@@ -3645,18 +3660,18 @@
             </a:spcAft>
           </a:pPr>
           <a:r>
-            <a:rPr lang="en-US" sz="1900" kern="1200" dirty="0" smtClean="0"/>
+            <a:rPr lang="en-US" sz="1800" kern="1200" dirty="0" smtClean="0"/>
             <a:t>Mix and match to </a:t>
           </a:r>
           <a:r>
-            <a:rPr lang="en-US" sz="1900" b="1" kern="1200" dirty="0" smtClean="0"/>
+            <a:rPr lang="en-US" sz="1800" b="1" kern="1200" dirty="0" smtClean="0"/>
             <a:t>optimize</a:t>
           </a:r>
           <a:r>
-            <a:rPr lang="en-US" sz="1900" kern="1200" dirty="0" smtClean="0"/>
+            <a:rPr lang="en-US" sz="1800" kern="1200" dirty="0" smtClean="0"/>
             <a:t> founder’s terms</a:t>
           </a:r>
-          <a:endParaRPr lang="en-US" sz="1900" kern="1200" dirty="0"/>
+          <a:endParaRPr lang="en-US" sz="1800" kern="1200" dirty="0"/>
         </a:p>
       </dsp:txBody>
       <dsp:txXfrm>
@@ -3750,7 +3765,7 @@
         </a:bodyPr>
         <a:lstStyle/>
         <a:p>
-          <a:pPr lvl="0" algn="l" defTabSz="844550">
+          <a:pPr lvl="0" algn="l" defTabSz="800100">
             <a:lnSpc>
               <a:spcPct val="90000"/>
             </a:lnSpc>
@@ -3762,14 +3777,14 @@
             </a:spcAft>
           </a:pPr>
           <a:r>
-            <a:rPr lang="en-US" sz="1900" b="1" kern="1200" dirty="0" smtClean="0"/>
+            <a:rPr lang="en-US" sz="1800" b="1" kern="1200" dirty="0" smtClean="0"/>
             <a:t>Choose</a:t>
           </a:r>
           <a:r>
-            <a:rPr lang="en-US" sz="1900" kern="1200" dirty="0" smtClean="0"/>
+            <a:rPr lang="en-US" sz="1800" kern="1200" dirty="0" smtClean="0"/>
             <a:t> the best form of business association </a:t>
           </a:r>
-          <a:endParaRPr lang="en-US" sz="1900" kern="1200" dirty="0"/>
+          <a:endParaRPr lang="en-US" sz="1800" kern="1200" dirty="0"/>
         </a:p>
       </dsp:txBody>
       <dsp:txXfrm>
@@ -3863,7 +3878,7 @@
         </a:bodyPr>
         <a:lstStyle/>
         <a:p>
-          <a:pPr lvl="0" algn="l" defTabSz="844550">
+          <a:pPr lvl="0" algn="l" defTabSz="800100">
             <a:lnSpc>
               <a:spcPct val="90000"/>
             </a:lnSpc>
@@ -3875,18 +3890,18 @@
             </a:spcAft>
           </a:pPr>
           <a:r>
-            <a:rPr lang="en-US" sz="1900" kern="1200" dirty="0" smtClean="0"/>
+            <a:rPr lang="en-US" sz="1800" kern="1200" dirty="0" smtClean="0"/>
             <a:t>Create the terms of use allowing the start up to </a:t>
           </a:r>
           <a:r>
-            <a:rPr lang="en-US" sz="1900" b="1" kern="1200" dirty="0" smtClean="0"/>
+            <a:rPr lang="en-US" sz="1800" b="1" kern="1200" dirty="0" smtClean="0"/>
             <a:t>START UP</a:t>
           </a:r>
           <a:r>
-            <a:rPr lang="en-US" sz="1900" kern="1200" dirty="0" smtClean="0"/>
+            <a:rPr lang="en-US" sz="1800" kern="1200" dirty="0" smtClean="0"/>
             <a:t> in a single day</a:t>
           </a:r>
-          <a:endParaRPr lang="en-US" sz="1900" kern="1200" dirty="0"/>
+          <a:endParaRPr lang="en-US" sz="1800" kern="1200" dirty="0"/>
         </a:p>
       </dsp:txBody>
       <dsp:txXfrm>
@@ -3980,7 +3995,7 @@
         </a:bodyPr>
         <a:lstStyle/>
         <a:p>
-          <a:pPr lvl="0" algn="l" defTabSz="844550">
+          <a:pPr lvl="0" algn="l" defTabSz="800100">
             <a:lnSpc>
               <a:spcPct val="90000"/>
             </a:lnSpc>
@@ -3992,34 +4007,34 @@
             </a:spcAft>
           </a:pPr>
           <a:r>
-            <a:rPr lang="en-US" sz="1900" b="1" kern="1200" dirty="0" smtClean="0"/>
+            <a:rPr lang="en-US" sz="1800" b="1" kern="1200" dirty="0" smtClean="0"/>
             <a:t>Analyze</a:t>
           </a:r>
           <a:r>
-            <a:rPr lang="en-US" sz="1900" kern="1200" dirty="0" smtClean="0"/>
+            <a:rPr lang="en-US" sz="1800" kern="1200" dirty="0" smtClean="0"/>
             <a:t>, </a:t>
           </a:r>
           <a:r>
-            <a:rPr lang="en-US" sz="1900" b="1" kern="1200" dirty="0" smtClean="0"/>
+            <a:rPr lang="en-US" sz="1800" b="1" kern="1200" dirty="0" smtClean="0"/>
             <a:t>invest</a:t>
           </a:r>
           <a:r>
-            <a:rPr lang="en-US" sz="1900" kern="1200" dirty="0" smtClean="0"/>
+            <a:rPr lang="en-US" sz="1800" kern="1200" dirty="0" smtClean="0"/>
             <a:t>, and </a:t>
           </a:r>
           <a:r>
-            <a:rPr lang="en-US" sz="1900" b="1" kern="1200" dirty="0" smtClean="0"/>
+            <a:rPr lang="en-US" sz="1800" b="1" kern="1200" dirty="0" smtClean="0"/>
             <a:t>dynamically</a:t>
           </a:r>
           <a:r>
-            <a:rPr lang="en-US" sz="1900" kern="1200" dirty="0" smtClean="0"/>
+            <a:rPr lang="en-US" sz="1800" kern="1200" dirty="0" smtClean="0"/>
             <a:t> update ownership and organization as the business evolves through rounds of traditional financing and </a:t>
           </a:r>
           <a:r>
-            <a:rPr lang="en-US" sz="1900" b="1" kern="1200" dirty="0" smtClean="0"/>
+            <a:rPr lang="en-US" sz="1800" b="1" kern="1200" dirty="0" smtClean="0"/>
             <a:t>crowd funding</a:t>
           </a:r>
-          <a:endParaRPr lang="en-US" sz="1900" b="1" kern="1200" dirty="0"/>
+          <a:endParaRPr lang="en-US" sz="1800" b="1" kern="1200" dirty="0"/>
         </a:p>
       </dsp:txBody>
       <dsp:txXfrm>
@@ -11715,7 +11730,7 @@
           <a:p>
             <a:fld id="{0D1CFB5E-1311-4346-8C5A-3103D9CE5E0D}" type="datetimeFigureOut">
               <a:rPr lang="en-US" smtClean="0"/>
-              <a:t>9/18/2014</a:t>
+              <a:t>9/20/14</a:t>
             </a:fld>
             <a:endParaRPr lang="en-US"/>
           </a:p>
@@ -11885,7 +11900,7 @@
           <a:p>
             <a:fld id="{0D1CFB5E-1311-4346-8C5A-3103D9CE5E0D}" type="datetimeFigureOut">
               <a:rPr lang="en-US" smtClean="0"/>
-              <a:t>9/18/2014</a:t>
+              <a:t>9/20/14</a:t>
             </a:fld>
             <a:endParaRPr lang="en-US"/>
           </a:p>
@@ -12065,7 +12080,7 @@
           <a:p>
             <a:fld id="{0D1CFB5E-1311-4346-8C5A-3103D9CE5E0D}" type="datetimeFigureOut">
               <a:rPr lang="en-US" smtClean="0"/>
-              <a:t>9/18/2014</a:t>
+              <a:t>9/20/14</a:t>
             </a:fld>
             <a:endParaRPr lang="en-US"/>
           </a:p>
@@ -12235,7 +12250,7 @@
           <a:p>
             <a:fld id="{0D1CFB5E-1311-4346-8C5A-3103D9CE5E0D}" type="datetimeFigureOut">
               <a:rPr lang="en-US" smtClean="0"/>
-              <a:t>9/18/2014</a:t>
+              <a:t>9/20/14</a:t>
             </a:fld>
             <a:endParaRPr lang="en-US"/>
           </a:p>
@@ -12481,7 +12496,7 @@
           <a:p>
             <a:fld id="{0D1CFB5E-1311-4346-8C5A-3103D9CE5E0D}" type="datetimeFigureOut">
               <a:rPr lang="en-US" smtClean="0"/>
-              <a:t>9/18/2014</a:t>
+              <a:t>9/20/14</a:t>
             </a:fld>
             <a:endParaRPr lang="en-US"/>
           </a:p>
@@ -12769,7 +12784,7 @@
           <a:p>
             <a:fld id="{0D1CFB5E-1311-4346-8C5A-3103D9CE5E0D}" type="datetimeFigureOut">
               <a:rPr lang="en-US" smtClean="0"/>
-              <a:t>9/18/2014</a:t>
+              <a:t>9/20/14</a:t>
             </a:fld>
             <a:endParaRPr lang="en-US"/>
           </a:p>
@@ -13191,7 +13206,7 @@
           <a:p>
             <a:fld id="{0D1CFB5E-1311-4346-8C5A-3103D9CE5E0D}" type="datetimeFigureOut">
               <a:rPr lang="en-US" smtClean="0"/>
-              <a:t>9/18/2014</a:t>
+              <a:t>9/20/14</a:t>
             </a:fld>
             <a:endParaRPr lang="en-US"/>
           </a:p>
@@ -13309,7 +13324,7 @@
           <a:p>
             <a:fld id="{0D1CFB5E-1311-4346-8C5A-3103D9CE5E0D}" type="datetimeFigureOut">
               <a:rPr lang="en-US" smtClean="0"/>
-              <a:t>9/18/2014</a:t>
+              <a:t>9/20/14</a:t>
             </a:fld>
             <a:endParaRPr lang="en-US"/>
           </a:p>
@@ -13404,7 +13419,7 @@
           <a:p>
             <a:fld id="{0D1CFB5E-1311-4346-8C5A-3103D9CE5E0D}" type="datetimeFigureOut">
               <a:rPr lang="en-US" smtClean="0"/>
-              <a:t>9/18/2014</a:t>
+              <a:t>9/20/14</a:t>
             </a:fld>
             <a:endParaRPr lang="en-US"/>
           </a:p>
@@ -13681,7 +13696,7 @@
           <a:p>
             <a:fld id="{0D1CFB5E-1311-4346-8C5A-3103D9CE5E0D}" type="datetimeFigureOut">
               <a:rPr lang="en-US" smtClean="0"/>
-              <a:t>9/18/2014</a:t>
+              <a:t>9/20/14</a:t>
             </a:fld>
             <a:endParaRPr lang="en-US"/>
           </a:p>
@@ -13934,7 +13949,7 @@
           <a:p>
             <a:fld id="{0D1CFB5E-1311-4346-8C5A-3103D9CE5E0D}" type="datetimeFigureOut">
               <a:rPr lang="en-US" smtClean="0"/>
-              <a:t>9/18/2014</a:t>
+              <a:t>9/20/14</a:t>
             </a:fld>
             <a:endParaRPr lang="en-US"/>
           </a:p>
@@ -14042,7 +14057,7 @@
           <a:graphicData uri="http://schemas.openxmlformats.org/presentationml/2006/ole">
             <mc:AlternateContent xmlns:mc="http://schemas.openxmlformats.org/markup-compatibility/2006">
               <mc:Choice xmlns:v="urn:schemas-microsoft-com:vml" Requires="v">
-                <p:oleObj spid="_x0000_s1027" name="think-cell Slide" r:id="rId15" imgW="216" imgH="216" progId="TCLayout.ActiveDocument.1">
+                <p:oleObj spid="_x0000_s1029" name="think-cell Slide" r:id="rId15" imgW="216" imgH="216" progId="TCLayout.ActiveDocument.1">
                   <p:embed/>
                 </p:oleObj>
               </mc:Choice>
@@ -14207,7 +14222,7 @@
           <a:p>
             <a:fld id="{0D1CFB5E-1311-4346-8C5A-3103D9CE5E0D}" type="datetimeFigureOut">
               <a:rPr lang="en-US" smtClean="0"/>
-              <a:t>9/18/2014</a:t>
+              <a:t>9/20/14</a:t>
             </a:fld>
             <a:endParaRPr lang="en-US"/>
           </a:p>
@@ -14615,7 +14630,7 @@
           <a:graphicData uri="http://schemas.openxmlformats.org/presentationml/2006/ole">
             <mc:AlternateContent xmlns:mc="http://schemas.openxmlformats.org/markup-compatibility/2006">
               <mc:Choice xmlns:v="urn:schemas-microsoft-com:vml" Requires="v">
-                <p:oleObj spid="_x0000_s5125" name="think-cell Slide" r:id="rId4" imgW="216" imgH="216" progId="TCLayout.ActiveDocument.1">
+                <p:oleObj spid="_x0000_s5127" name="think-cell Slide" r:id="rId4" imgW="216" imgH="216" progId="TCLayout.ActiveDocument.1">
                   <p:embed/>
                 </p:oleObj>
               </mc:Choice>
@@ -14681,7 +14696,7 @@
           </a:prstGeom>
           <a:noFill/>
           <a:extLst>
-            <a:ext uri="{909E8E84-426E-40DD-AFC4-6F175D3DCCD1}">
+            <a:ext uri="{909E8E84-426E-40dd-AFC4-6F175D3DCCD1}">
               <a14:hiddenFill xmlns:a14="http://schemas.microsoft.com/office/drawing/2010/main">
                 <a:solidFill>
                   <a:srgbClr val="FFFFFF"/>
@@ -14820,7 +14835,7 @@
   <p:timing>
     <p:tnLst>
       <p:par>
-        <p:cTn id="1" dur="indefinite" restart="never" nodeType="tmRoot"/>
+        <p:cTn xmlns:p14="http://schemas.microsoft.com/office/powerpoint/2010/main" id="1" dur="indefinite" restart="never" nodeType="tmRoot"/>
       </p:par>
     </p:tnLst>
   </p:timing>
@@ -14903,7 +14918,7 @@
   <p:timing>
     <p:tnLst>
       <p:par>
-        <p:cTn id="1" dur="indefinite" restart="never" nodeType="tmRoot"/>
+        <p:cTn xmlns:p14="http://schemas.microsoft.com/office/powerpoint/2010/main" id="1" dur="indefinite" restart="never" nodeType="tmRoot"/>
       </p:par>
     </p:tnLst>
   </p:timing>
@@ -14984,7 +14999,7 @@
   <p:timing>
     <p:tnLst>
       <p:par>
-        <p:cTn id="1" dur="indefinite" restart="never" nodeType="tmRoot"/>
+        <p:cTn xmlns:p14="http://schemas.microsoft.com/office/powerpoint/2010/main" id="1" dur="indefinite" restart="never" nodeType="tmRoot"/>
       </p:par>
     </p:tnLst>
   </p:timing>
@@ -15075,7 +15090,7 @@
   <p:timing>
     <p:tnLst>
       <p:par>
-        <p:cTn id="1" dur="indefinite" restart="never" nodeType="tmRoot"/>
+        <p:cTn xmlns:p14="http://schemas.microsoft.com/office/powerpoint/2010/main" id="1" dur="indefinite" restart="never" nodeType="tmRoot"/>
       </p:par>
     </p:tnLst>
   </p:timing>
@@ -15161,10 +15176,105 @@
   <p:timing>
     <p:tnLst>
       <p:par>
-        <p:cTn id="1" dur="indefinite" restart="never" nodeType="tmRoot"/>
+        <p:cTn xmlns:p14="http://schemas.microsoft.com/office/powerpoint/2010/main" id="1" dur="indefinite" restart="never" nodeType="tmRoot"/>
       </p:par>
     </p:tnLst>
   </p:timing>
+</p:sld>
+</file>
+
+<file path=ppt/slides/slide14.xml><?xml version="1.0" encoding="utf-8"?>
+<p:sld xmlns:a="http://schemas.openxmlformats.org/drawingml/2006/main" xmlns:r="http://schemas.openxmlformats.org/officeDocument/2006/relationships" xmlns:p="http://schemas.openxmlformats.org/presentationml/2006/main">
+  <p:cSld>
+    <p:spTree>
+      <p:nvGrpSpPr>
+        <p:cNvPr id="1" name=""/>
+        <p:cNvGrpSpPr/>
+        <p:nvPr/>
+      </p:nvGrpSpPr>
+      <p:grpSpPr>
+        <a:xfrm>
+          <a:off x="0" y="0"/>
+          <a:ext cx="0" cy="0"/>
+          <a:chOff x="0" y="0"/>
+          <a:chExt cx="0" cy="0"/>
+        </a:xfrm>
+      </p:grpSpPr>
+      <p:sp>
+        <p:nvSpPr>
+          <p:cNvPr id="2" name="Title 1"/>
+          <p:cNvSpPr>
+            <a:spLocks noGrp="1"/>
+          </p:cNvSpPr>
+          <p:nvPr>
+            <p:ph type="title"/>
+          </p:nvPr>
+        </p:nvSpPr>
+        <p:spPr/>
+        <p:txBody>
+          <a:bodyPr/>
+          <a:lstStyle/>
+          <a:p>
+            <a:r>
+              <a:rPr lang="en-US" dirty="0" smtClean="0"/>
+              <a:t>For More Information:</a:t>
+            </a:r>
+            <a:endParaRPr lang="en-US" dirty="0"/>
+          </a:p>
+        </p:txBody>
+      </p:sp>
+      <p:sp>
+        <p:nvSpPr>
+          <p:cNvPr id="3" name="Content Placeholder 2"/>
+          <p:cNvSpPr>
+            <a:spLocks noGrp="1"/>
+          </p:cNvSpPr>
+          <p:nvPr>
+            <p:ph idx="1"/>
+          </p:nvPr>
+        </p:nvSpPr>
+        <p:spPr/>
+        <p:txBody>
+          <a:bodyPr/>
+          <a:lstStyle/>
+          <a:p>
+            <a:r>
+              <a:rPr lang="en-US" dirty="0"/>
+              <a:t>https://</a:t>
+            </a:r>
+            <a:r>
+              <a:rPr lang="en-US" dirty="0" err="1"/>
+              <a:t>github.com</a:t>
+            </a:r>
+            <a:r>
+              <a:rPr lang="en-US" dirty="0"/>
+              <a:t>/</a:t>
+            </a:r>
+            <a:r>
+              <a:rPr lang="en-US" dirty="0" err="1"/>
+              <a:t>HumanDynamics</a:t>
+            </a:r>
+            <a:r>
+              <a:rPr lang="en-US" dirty="0"/>
+              <a:t>/</a:t>
+            </a:r>
+            <a:r>
+              <a:rPr lang="en-US"/>
+              <a:t>CodeTheDeal</a:t>
+            </a:r>
+          </a:p>
+        </p:txBody>
+      </p:sp>
+    </p:spTree>
+    <p:extLst>
+      <p:ext uri="{BB962C8B-B14F-4D97-AF65-F5344CB8AC3E}">
+        <p14:creationId xmlns:p14="http://schemas.microsoft.com/office/powerpoint/2010/main" val="3553741950"/>
+      </p:ext>
+    </p:extLst>
+  </p:cSld>
+  <p:clrMapOvr>
+    <a:masterClrMapping/>
+  </p:clrMapOvr>
 </p:sld>
 </file>
 
@@ -15210,7 +15320,7 @@
           <a:graphicData uri="http://schemas.openxmlformats.org/presentationml/2006/ole">
             <mc:AlternateContent xmlns:mc="http://schemas.openxmlformats.org/markup-compatibility/2006">
               <mc:Choice xmlns:v="urn:schemas-microsoft-com:vml" Requires="v">
-                <p:oleObj spid="_x0000_s2051" name="think-cell Slide" r:id="rId6" imgW="216" imgH="216" progId="TCLayout.ActiveDocument.1">
+                <p:oleObj spid="_x0000_s2053" name="think-cell Slide" r:id="rId6" imgW="216" imgH="216" progId="TCLayout.ActiveDocument.1">
                   <p:embed/>
                 </p:oleObj>
               </mc:Choice>
@@ -15329,7 +15439,7 @@
             </a:solidFill>
           </a:ln>
           <a:extLst>
-            <a:ext uri="{909E8E84-426E-40DD-AFC4-6F175D3DCCD1}">
+            <a:ext uri="{909E8E84-426E-40dd-AFC4-6F175D3DCCD1}">
               <a14:hiddenFill xmlns:a14="http://schemas.microsoft.com/office/drawing/2010/main">
                 <a:solidFill>
                   <a:scrgbClr r="0" g="0" b="0"/>
@@ -15557,18 +15667,18 @@
   <p:clrMapOvr>
     <a:masterClrMapping/>
   </p:clrMapOvr>
-  <mc:AlternateContent xmlns:mc="http://schemas.openxmlformats.org/markup-compatibility/2006">
-    <mc:Choice xmlns:p14="http://schemas.microsoft.com/office/powerpoint/2010/main" Requires="p14">
+  <mc:AlternateContent xmlns:mc="http://schemas.openxmlformats.org/markup-compatibility/2006" xmlns:p14="http://schemas.microsoft.com/office/powerpoint/2010/main">
+    <mc:Choice Requires="p14">
       <p:transition spd="slow" p14:dur="2000"/>
     </mc:Choice>
-    <mc:Fallback>
+    <mc:Fallback xmlns="">
       <p:transition spd="slow"/>
     </mc:Fallback>
   </mc:AlternateContent>
   <p:timing>
     <p:tnLst>
       <p:par>
-        <p:cTn id="1" dur="indefinite" restart="never" nodeType="tmRoot"/>
+        <p:cTn xmlns:p14="http://schemas.microsoft.com/office/powerpoint/2010/main" id="1" dur="indefinite" restart="never" nodeType="tmRoot"/>
       </p:par>
     </p:tnLst>
   </p:timing>
@@ -15617,7 +15727,7 @@
           <a:graphicData uri="http://schemas.openxmlformats.org/presentationml/2006/ole">
             <mc:AlternateContent xmlns:mc="http://schemas.openxmlformats.org/markup-compatibility/2006">
               <mc:Choice xmlns:v="urn:schemas-microsoft-com:vml" Requires="v">
-                <p:oleObj spid="_x0000_s3075" name="think-cell Slide" r:id="rId4" imgW="216" imgH="216" progId="TCLayout.ActiveDocument.1">
+                <p:oleObj spid="_x0000_s3077" name="think-cell Slide" r:id="rId4" imgW="216" imgH="216" progId="TCLayout.ActiveDocument.1">
                   <p:embed/>
                 </p:oleObj>
               </mc:Choice>
@@ -15707,7 +15817,7 @@
   <p:timing>
     <p:tnLst>
       <p:par>
-        <p:cTn id="1" dur="indefinite" restart="never" nodeType="tmRoot"/>
+        <p:cTn xmlns:p14="http://schemas.microsoft.com/office/powerpoint/2010/main" id="1" dur="indefinite" restart="never" nodeType="tmRoot"/>
       </p:par>
     </p:tnLst>
   </p:timing>
@@ -15756,7 +15866,7 @@
           <a:graphicData uri="http://schemas.openxmlformats.org/presentationml/2006/ole">
             <mc:AlternateContent xmlns:mc="http://schemas.openxmlformats.org/markup-compatibility/2006">
               <mc:Choice xmlns:v="urn:schemas-microsoft-com:vml" Requires="v">
-                <p:oleObj spid="_x0000_s4099" name="think-cell Slide" r:id="rId4" imgW="216" imgH="216" progId="TCLayout.ActiveDocument.1">
+                <p:oleObj spid="_x0000_s4101" name="think-cell Slide" r:id="rId4" imgW="216" imgH="216" progId="TCLayout.ActiveDocument.1">
                   <p:embed/>
                 </p:oleObj>
               </mc:Choice>
@@ -15880,7 +15990,7 @@
   <p:timing>
     <p:tnLst>
       <p:par>
-        <p:cTn id="1" dur="indefinite" restart="never" nodeType="tmRoot"/>
+        <p:cTn xmlns:p14="http://schemas.microsoft.com/office/powerpoint/2010/main" id="1" dur="indefinite" restart="never" nodeType="tmRoot"/>
       </p:par>
     </p:tnLst>
   </p:timing>
@@ -15967,7 +16077,7 @@
   <p:timing>
     <p:tnLst>
       <p:par>
-        <p:cTn id="1" dur="indefinite" restart="never" nodeType="tmRoot"/>
+        <p:cTn xmlns:p14="http://schemas.microsoft.com/office/powerpoint/2010/main" id="1" dur="indefinite" restart="never" nodeType="tmRoot"/>
       </p:par>
     </p:tnLst>
   </p:timing>
@@ -16093,7 +16203,7 @@
   <p:timing>
     <p:tnLst>
       <p:par>
-        <p:cTn id="1" dur="indefinite" restart="never" nodeType="tmRoot">
+        <p:cTn xmlns:p14="http://schemas.microsoft.com/office/powerpoint/2010/main" id="1" dur="indefinite" restart="never" nodeType="tmRoot">
           <p:childTnLst>
             <p:seq concurrent="1" nextAc="seek">
               <p:cTn id="2" dur="indefinite" nodeType="mainSeq">
@@ -16265,7 +16375,7 @@
   <p:timing>
     <p:tnLst>
       <p:par>
-        <p:cTn id="1" dur="indefinite" restart="never" nodeType="tmRoot"/>
+        <p:cTn xmlns:p14="http://schemas.microsoft.com/office/powerpoint/2010/main" id="1" dur="indefinite" restart="never" nodeType="tmRoot"/>
       </p:par>
     </p:tnLst>
   </p:timing>
@@ -16344,7 +16454,7 @@
   <p:timing>
     <p:tnLst>
       <p:par>
-        <p:cTn id="1" dur="indefinite" restart="never" nodeType="tmRoot"/>
+        <p:cTn xmlns:p14="http://schemas.microsoft.com/office/powerpoint/2010/main" id="1" dur="indefinite" restart="never" nodeType="tmRoot"/>
       </p:par>
     </p:tnLst>
   </p:timing>
@@ -16431,7 +16541,7 @@
   <p:timing>
     <p:tnLst>
       <p:par>
-        <p:cTn id="1" dur="indefinite" restart="never" nodeType="tmRoot"/>
+        <p:cTn xmlns:p14="http://schemas.microsoft.com/office/powerpoint/2010/main" id="1" dur="indefinite" restart="never" nodeType="tmRoot"/>
       </p:par>
     </p:tnLst>
   </p:timing>

</xml_diff>